<commit_message>
an error in reachable set.
</commit_message>
<xml_diff>
--- a/journalWallFriction/pictures/pdf/reachableSetCircle.pptx
+++ b/journalWallFriction/pictures/pdf/reachableSetCircle.pptx
@@ -243,7 +243,7 @@
           <a:p>
             <a:fld id="{98BB718C-238A-7041-808F-C250553F956E}" type="datetimeFigureOut">
               <a:rPr lang="en-US" smtClean="0"/>
-              <a:t>5/29/18</a:t>
+              <a:t>5/30/18</a:t>
             </a:fld>
             <a:endParaRPr lang="en-US"/>
           </a:p>
@@ -413,7 +413,7 @@
           <a:p>
             <a:fld id="{98BB718C-238A-7041-808F-C250553F956E}" type="datetimeFigureOut">
               <a:rPr lang="en-US" smtClean="0"/>
-              <a:t>5/29/18</a:t>
+              <a:t>5/30/18</a:t>
             </a:fld>
             <a:endParaRPr lang="en-US"/>
           </a:p>
@@ -593,7 +593,7 @@
           <a:p>
             <a:fld id="{98BB718C-238A-7041-808F-C250553F956E}" type="datetimeFigureOut">
               <a:rPr lang="en-US" smtClean="0"/>
-              <a:t>5/29/18</a:t>
+              <a:t>5/30/18</a:t>
             </a:fld>
             <a:endParaRPr lang="en-US"/>
           </a:p>
@@ -763,7 +763,7 @@
           <a:p>
             <a:fld id="{98BB718C-238A-7041-808F-C250553F956E}" type="datetimeFigureOut">
               <a:rPr lang="en-US" smtClean="0"/>
-              <a:t>5/29/18</a:t>
+              <a:t>5/30/18</a:t>
             </a:fld>
             <a:endParaRPr lang="en-US"/>
           </a:p>
@@ -1007,7 +1007,7 @@
           <a:p>
             <a:fld id="{98BB718C-238A-7041-808F-C250553F956E}" type="datetimeFigureOut">
               <a:rPr lang="en-US" smtClean="0"/>
-              <a:t>5/29/18</a:t>
+              <a:t>5/30/18</a:t>
             </a:fld>
             <a:endParaRPr lang="en-US"/>
           </a:p>
@@ -1239,7 +1239,7 @@
           <a:p>
             <a:fld id="{98BB718C-238A-7041-808F-C250553F956E}" type="datetimeFigureOut">
               <a:rPr lang="en-US" smtClean="0"/>
-              <a:t>5/29/18</a:t>
+              <a:t>5/30/18</a:t>
             </a:fld>
             <a:endParaRPr lang="en-US"/>
           </a:p>
@@ -1606,7 +1606,7 @@
           <a:p>
             <a:fld id="{98BB718C-238A-7041-808F-C250553F956E}" type="datetimeFigureOut">
               <a:rPr lang="en-US" smtClean="0"/>
-              <a:t>5/29/18</a:t>
+              <a:t>5/30/18</a:t>
             </a:fld>
             <a:endParaRPr lang="en-US"/>
           </a:p>
@@ -1724,7 +1724,7 @@
           <a:p>
             <a:fld id="{98BB718C-238A-7041-808F-C250553F956E}" type="datetimeFigureOut">
               <a:rPr lang="en-US" smtClean="0"/>
-              <a:t>5/29/18</a:t>
+              <a:t>5/30/18</a:t>
             </a:fld>
             <a:endParaRPr lang="en-US"/>
           </a:p>
@@ -1819,7 +1819,7 @@
           <a:p>
             <a:fld id="{98BB718C-238A-7041-808F-C250553F956E}" type="datetimeFigureOut">
               <a:rPr lang="en-US" smtClean="0"/>
-              <a:t>5/29/18</a:t>
+              <a:t>5/30/18</a:t>
             </a:fld>
             <a:endParaRPr lang="en-US"/>
           </a:p>
@@ -2096,7 +2096,7 @@
           <a:p>
             <a:fld id="{98BB718C-238A-7041-808F-C250553F956E}" type="datetimeFigureOut">
               <a:rPr lang="en-US" smtClean="0"/>
-              <a:t>5/29/18</a:t>
+              <a:t>5/30/18</a:t>
             </a:fld>
             <a:endParaRPr lang="en-US"/>
           </a:p>
@@ -2353,7 +2353,7 @@
           <a:p>
             <a:fld id="{98BB718C-238A-7041-808F-C250553F956E}" type="datetimeFigureOut">
               <a:rPr lang="en-US" smtClean="0"/>
-              <a:t>5/29/18</a:t>
+              <a:t>5/30/18</a:t>
             </a:fld>
             <a:endParaRPr lang="en-US"/>
           </a:p>
@@ -2566,7 +2566,7 @@
           <a:p>
             <a:fld id="{98BB718C-238A-7041-808F-C250553F956E}" type="datetimeFigureOut">
               <a:rPr lang="en-US" smtClean="0"/>
-              <a:t>5/29/18</a:t>
+              <a:t>5/30/18</a:t>
             </a:fld>
             <a:endParaRPr lang="en-US"/>
           </a:p>
@@ -3001,8 +3001,8 @@
           </a:prstGeom>
         </p:spPr>
       </p:pic>
-      <mc:AlternateContent xmlns:mc="http://schemas.openxmlformats.org/markup-compatibility/2006">
-        <mc:Choice xmlns:a14="http://schemas.microsoft.com/office/drawing/2010/main" Requires="a14">
+      <mc:AlternateContent xmlns:mc="http://schemas.openxmlformats.org/markup-compatibility/2006" xmlns:a14="http://schemas.microsoft.com/office/drawing/2010/main">
+        <mc:Choice Requires="a14">
           <p:sp>
             <p:nvSpPr>
               <p:cNvPr id="124" name="TextBox 123">
@@ -3066,7 +3066,7 @@
             </p:txBody>
           </p:sp>
         </mc:Choice>
-        <mc:Fallback>
+        <mc:Fallback xmlns="">
           <p:sp>
             <p:nvSpPr>
               <p:cNvPr id="124" name="TextBox 123">
@@ -3151,7 +3151,7 @@
                 <a:latin typeface="Times" pitchFamily="2" charset="0"/>
                 <a:cs typeface="Times New Roman" panose="02020603050405020304" pitchFamily="18" charset="0"/>
               </a:rPr>
-              <a:t>1</a:t>
+              <a:t>4</a:t>
             </a:r>
           </a:p>
         </p:txBody>
@@ -3185,7 +3185,7 @@
           <a:lstStyle/>
           <a:p>
             <a:r>
-              <a:rPr lang="en-US" sz="2000" i="1" dirty="0">
+              <a:rPr lang="en-US" sz="2000" i="1">
                 <a:latin typeface="Times" pitchFamily="2" charset="0"/>
                 <a:cs typeface="Times New Roman" panose="02020603050405020304" pitchFamily="18" charset="0"/>
               </a:rPr>
@@ -3196,7 +3196,7 @@
                 <a:latin typeface="Times" pitchFamily="2" charset="0"/>
                 <a:cs typeface="Times New Roman" panose="02020603050405020304" pitchFamily="18" charset="0"/>
               </a:rPr>
-              <a:t>4</a:t>
+              <a:t>3</a:t>
             </a:r>
           </a:p>
         </p:txBody>
@@ -3241,7 +3241,7 @@
                 <a:latin typeface="Times" pitchFamily="2" charset="0"/>
                 <a:cs typeface="Times New Roman" panose="02020603050405020304" pitchFamily="18" charset="0"/>
               </a:rPr>
-              <a:t>3</a:t>
+              <a:t>2</a:t>
             </a:r>
           </a:p>
         </p:txBody>
@@ -3286,7 +3286,7 @@
                 <a:latin typeface="Times" pitchFamily="2" charset="0"/>
                 <a:cs typeface="Times New Roman" panose="02020603050405020304" pitchFamily="18" charset="0"/>
               </a:rPr>
-              <a:t>2</a:t>
+              <a:t>1</a:t>
             </a:r>
           </a:p>
         </p:txBody>
@@ -3395,8 +3395,8 @@
           </a:fontRef>
         </p:style>
       </p:cxnSp>
-      <mc:AlternateContent xmlns:mc="http://schemas.openxmlformats.org/markup-compatibility/2006">
-        <mc:Choice xmlns:a14="http://schemas.microsoft.com/office/drawing/2010/main" Requires="a14">
+      <mc:AlternateContent xmlns:mc="http://schemas.openxmlformats.org/markup-compatibility/2006" xmlns:a14="http://schemas.microsoft.com/office/drawing/2010/main">
+        <mc:Choice Requires="a14">
           <p:sp>
             <p:nvSpPr>
               <p:cNvPr id="131" name="TextBox 130">
@@ -3466,7 +3466,7 @@
             </p:txBody>
           </p:sp>
         </mc:Choice>
-        <mc:Fallback>
+        <mc:Fallback xmlns="">
           <p:sp>
             <p:nvSpPr>
               <p:cNvPr id="131" name="TextBox 130">
@@ -3747,8 +3747,8 @@
           </a:fontRef>
         </p:style>
       </p:cxnSp>
-      <mc:AlternateContent xmlns:mc="http://schemas.openxmlformats.org/markup-compatibility/2006">
-        <mc:Choice xmlns:a14="http://schemas.microsoft.com/office/drawing/2010/main" Requires="a14">
+      <mc:AlternateContent xmlns:mc="http://schemas.openxmlformats.org/markup-compatibility/2006" xmlns:a14="http://schemas.microsoft.com/office/drawing/2010/main">
+        <mc:Choice Requires="a14">
           <p:sp>
             <p:nvSpPr>
               <p:cNvPr id="138" name="TextBox 137">
@@ -3799,7 +3799,7 @@
             </p:txBody>
           </p:sp>
         </mc:Choice>
-        <mc:Fallback>
+        <mc:Fallback xmlns="">
           <p:sp>
             <p:nvSpPr>
               <p:cNvPr id="138" name="TextBox 137">
@@ -3844,8 +3844,8 @@
           </p:sp>
         </mc:Fallback>
       </mc:AlternateContent>
-      <mc:AlternateContent xmlns:mc="http://schemas.openxmlformats.org/markup-compatibility/2006">
-        <mc:Choice xmlns:a14="http://schemas.microsoft.com/office/drawing/2010/main" Requires="a14">
+      <mc:AlternateContent xmlns:mc="http://schemas.openxmlformats.org/markup-compatibility/2006" xmlns:a14="http://schemas.microsoft.com/office/drawing/2010/main">
+        <mc:Choice Requires="a14">
           <p:sp>
             <p:nvSpPr>
               <p:cNvPr id="139" name="TextBox 138">
@@ -3896,7 +3896,7 @@
             </p:txBody>
           </p:sp>
         </mc:Choice>
-        <mc:Fallback>
+        <mc:Fallback xmlns="">
           <p:sp>
             <p:nvSpPr>
               <p:cNvPr id="139" name="TextBox 138">
@@ -4255,8 +4255,8 @@
             </a:p>
           </p:txBody>
         </p:sp>
-        <mc:AlternateContent xmlns:mc="http://schemas.openxmlformats.org/markup-compatibility/2006">
-          <mc:Choice xmlns:a14="http://schemas.microsoft.com/office/drawing/2010/main" Requires="a14">
+        <mc:AlternateContent xmlns:mc="http://schemas.openxmlformats.org/markup-compatibility/2006" xmlns:a14="http://schemas.microsoft.com/office/drawing/2010/main">
+          <mc:Choice Requires="a14">
             <p:sp>
               <p:nvSpPr>
                 <p:cNvPr id="145" name="TextBox 144">
@@ -4336,7 +4336,7 @@
               </p:txBody>
             </p:sp>
           </mc:Choice>
-          <mc:Fallback>
+          <mc:Fallback xmlns="">
             <p:sp>
               <p:nvSpPr>
                 <p:cNvPr id="145" name="TextBox 144">
@@ -4381,8 +4381,8 @@
             </p:sp>
           </mc:Fallback>
         </mc:AlternateContent>
-        <mc:AlternateContent xmlns:mc="http://schemas.openxmlformats.org/markup-compatibility/2006">
-          <mc:Choice xmlns:a14="http://schemas.microsoft.com/office/drawing/2010/main" Requires="a14">
+        <mc:AlternateContent xmlns:mc="http://schemas.openxmlformats.org/markup-compatibility/2006" xmlns:a14="http://schemas.microsoft.com/office/drawing/2010/main">
+          <mc:Choice Requires="a14">
             <p:sp>
               <p:nvSpPr>
                 <p:cNvPr id="146" name="TextBox 145">
@@ -4433,7 +4433,7 @@
               </p:txBody>
             </p:sp>
           </mc:Choice>
-          <mc:Fallback>
+          <mc:Fallback xmlns="">
             <p:sp>
               <p:nvSpPr>
                 <p:cNvPr id="146" name="TextBox 145">
@@ -4671,8 +4671,8 @@
             </a:p>
           </p:txBody>
         </p:sp>
-        <mc:AlternateContent xmlns:mc="http://schemas.openxmlformats.org/markup-compatibility/2006">
-          <mc:Choice xmlns:a14="http://schemas.microsoft.com/office/drawing/2010/main" Requires="a14">
+        <mc:AlternateContent xmlns:mc="http://schemas.openxmlformats.org/markup-compatibility/2006" xmlns:a14="http://schemas.microsoft.com/office/drawing/2010/main">
+          <mc:Choice Requires="a14">
             <p:sp>
               <p:nvSpPr>
                 <p:cNvPr id="151" name="TextBox 150">
@@ -4742,7 +4742,7 @@
               </p:txBody>
             </p:sp>
           </mc:Choice>
-          <mc:Fallback>
+          <mc:Fallback xmlns="">
             <p:sp>
               <p:nvSpPr>
                 <p:cNvPr id="151" name="TextBox 150">
@@ -5129,8 +5129,8 @@
             </a:p>
           </p:txBody>
         </p:sp>
-        <mc:AlternateContent xmlns:mc="http://schemas.openxmlformats.org/markup-compatibility/2006">
-          <mc:Choice xmlns:a14="http://schemas.microsoft.com/office/drawing/2010/main" Requires="a14">
+        <mc:AlternateContent xmlns:mc="http://schemas.openxmlformats.org/markup-compatibility/2006" xmlns:a14="http://schemas.microsoft.com/office/drawing/2010/main">
+          <mc:Choice Requires="a14">
             <p:sp>
               <p:nvSpPr>
                 <p:cNvPr id="170" name="TextBox 169">
@@ -5181,7 +5181,7 @@
               </p:txBody>
             </p:sp>
           </mc:Choice>
-          <mc:Fallback>
+          <mc:Fallback xmlns="">
             <p:sp>
               <p:nvSpPr>
                 <p:cNvPr id="170" name="TextBox 169">
@@ -5226,8 +5226,8 @@
             </p:sp>
           </mc:Fallback>
         </mc:AlternateContent>
-        <mc:AlternateContent xmlns:mc="http://schemas.openxmlformats.org/markup-compatibility/2006">
-          <mc:Choice xmlns:a14="http://schemas.microsoft.com/office/drawing/2010/main" Requires="a14">
+        <mc:AlternateContent xmlns:mc="http://schemas.openxmlformats.org/markup-compatibility/2006" xmlns:a14="http://schemas.microsoft.com/office/drawing/2010/main">
+          <mc:Choice Requires="a14">
             <p:sp>
               <p:nvSpPr>
                 <p:cNvPr id="171" name="TextBox 170">
@@ -5278,7 +5278,7 @@
               </p:txBody>
             </p:sp>
           </mc:Choice>
-          <mc:Fallback>
+          <mc:Fallback xmlns="">
             <p:sp>
               <p:nvSpPr>
                 <p:cNvPr id="171" name="TextBox 170">
@@ -5323,8 +5323,8 @@
             </p:sp>
           </mc:Fallback>
         </mc:AlternateContent>
-        <mc:AlternateContent xmlns:mc="http://schemas.openxmlformats.org/markup-compatibility/2006">
-          <mc:Choice xmlns:a14="http://schemas.microsoft.com/office/drawing/2010/main" Requires="a14">
+        <mc:AlternateContent xmlns:mc="http://schemas.openxmlformats.org/markup-compatibility/2006" xmlns:a14="http://schemas.microsoft.com/office/drawing/2010/main">
+          <mc:Choice Requires="a14">
             <p:sp>
               <p:nvSpPr>
                 <p:cNvPr id="172" name="TextBox 171">
@@ -5394,7 +5394,7 @@
               </p:txBody>
             </p:sp>
           </mc:Choice>
-          <mc:Fallback>
+          <mc:Fallback xmlns="">
             <p:sp>
               <p:nvSpPr>
                 <p:cNvPr id="172" name="TextBox 171">
@@ -5484,8 +5484,8 @@
             </a:fontRef>
           </p:style>
         </p:cxnSp>
-        <mc:AlternateContent xmlns:mc="http://schemas.openxmlformats.org/markup-compatibility/2006">
-          <mc:Choice xmlns:a14="http://schemas.microsoft.com/office/drawing/2010/main" Requires="a14">
+        <mc:AlternateContent xmlns:mc="http://schemas.openxmlformats.org/markup-compatibility/2006" xmlns:a14="http://schemas.microsoft.com/office/drawing/2010/main">
+          <mc:Choice Requires="a14">
             <p:sp>
               <p:nvSpPr>
                 <p:cNvPr id="174" name="TextBox 173">
@@ -5588,7 +5588,7 @@
               </p:txBody>
             </p:sp>
           </mc:Choice>
-          <mc:Fallback>
+          <mc:Fallback xmlns="">
             <p:sp>
               <p:nvSpPr>
                 <p:cNvPr id="174" name="TextBox 173">
@@ -6137,8 +6137,8 @@
             </a:fontRef>
           </p:style>
         </p:cxnSp>
-        <mc:AlternateContent xmlns:mc="http://schemas.openxmlformats.org/markup-compatibility/2006">
-          <mc:Choice xmlns:a14="http://schemas.microsoft.com/office/drawing/2010/main" Requires="a14">
+        <mc:AlternateContent xmlns:mc="http://schemas.openxmlformats.org/markup-compatibility/2006" xmlns:a14="http://schemas.microsoft.com/office/drawing/2010/main">
+          <mc:Choice Requires="a14">
             <p:sp>
               <p:nvSpPr>
                 <p:cNvPr id="176" name="TextBox 175">
@@ -6208,7 +6208,7 @@
               </p:txBody>
             </p:sp>
           </mc:Choice>
-          <mc:Fallback>
+          <mc:Fallback xmlns="">
             <p:sp>
               <p:nvSpPr>
                 <p:cNvPr id="176" name="TextBox 175">
@@ -6341,8 +6341,8 @@
             </a:p>
           </p:txBody>
         </p:sp>
-        <mc:AlternateContent xmlns:mc="http://schemas.openxmlformats.org/markup-compatibility/2006">
-          <mc:Choice xmlns:a14="http://schemas.microsoft.com/office/drawing/2010/main" Requires="a14">
+        <mc:AlternateContent xmlns:mc="http://schemas.openxmlformats.org/markup-compatibility/2006" xmlns:a14="http://schemas.microsoft.com/office/drawing/2010/main">
+          <mc:Choice Requires="a14">
             <p:sp>
               <p:nvSpPr>
                 <p:cNvPr id="179" name="TextBox 178">
@@ -6393,7 +6393,7 @@
               </p:txBody>
             </p:sp>
           </mc:Choice>
-          <mc:Fallback>
+          <mc:Fallback xmlns="">
             <p:sp>
               <p:nvSpPr>
                 <p:cNvPr id="179" name="TextBox 178">
@@ -6690,8 +6690,8 @@
           </a:p>
         </p:txBody>
       </p:sp>
-      <mc:AlternateContent xmlns:mc="http://schemas.openxmlformats.org/markup-compatibility/2006">
-        <mc:Choice xmlns:a14="http://schemas.microsoft.com/office/drawing/2010/main" Requires="a14">
+      <mc:AlternateContent xmlns:mc="http://schemas.openxmlformats.org/markup-compatibility/2006" xmlns:a14="http://schemas.microsoft.com/office/drawing/2010/main">
+        <mc:Choice Requires="a14">
           <p:sp>
             <p:nvSpPr>
               <p:cNvPr id="202" name="TextBox 201">
@@ -6744,7 +6744,7 @@
             </p:txBody>
           </p:sp>
         </mc:Choice>
-        <mc:Fallback>
+        <mc:Fallback xmlns="">
           <p:sp>
             <p:nvSpPr>
               <p:cNvPr id="202" name="TextBox 201">
@@ -6789,8 +6789,8 @@
           </p:sp>
         </mc:Fallback>
       </mc:AlternateContent>
-      <mc:AlternateContent xmlns:mc="http://schemas.openxmlformats.org/markup-compatibility/2006">
-        <mc:Choice xmlns:a14="http://schemas.microsoft.com/office/drawing/2010/main" Requires="a14">
+      <mc:AlternateContent xmlns:mc="http://schemas.openxmlformats.org/markup-compatibility/2006" xmlns:a14="http://schemas.microsoft.com/office/drawing/2010/main">
+        <mc:Choice Requires="a14">
           <p:sp>
             <p:nvSpPr>
               <p:cNvPr id="203" name="TextBox 202">
@@ -6860,7 +6860,7 @@
             </p:txBody>
           </p:sp>
         </mc:Choice>
-        <mc:Fallback>
+        <mc:Fallback xmlns="">
           <p:sp>
             <p:nvSpPr>
               <p:cNvPr id="203" name="TextBox 202">

</xml_diff>